<commit_message>
add comments to pptx
</commit_message>
<xml_diff>
--- a/Data Analysis/2-17-25 Calibration and Test/Chl a calibration slides.pptx
+++ b/Data Analysis/2-17-25 Calibration and Test/Chl a calibration slides.pptx
@@ -115,6 +115,110 @@
 </p:presentation>
 </file>
 
+<file path=ppt/authors.xml><?xml version="1.0" encoding="utf-8"?>
+<p188:authorLst xmlns:a="http://schemas.openxmlformats.org/drawingml/2006/main" xmlns:r="http://schemas.openxmlformats.org/officeDocument/2006/relationships" xmlns:p188="http://schemas.microsoft.com/office/powerpoint/2018/8/main">
+  <p188:author id="{8A2040D5-E15A-5B35-04E9-E0BDBFB1B2F2}" name="Bresnahan, Philip  J." initials="" userId="S::bresnahanp@uncw.edu::3c9c43df-f33c-4d09-be87-9aa5776ba221" providerId="AD"/>
+</p188:authorLst>
+</file>
+
+<file path=ppt/comments/modernComment_101_2DCF528A.xml><?xml version="1.0" encoding="utf-8"?>
+<p188:cmLst xmlns:a="http://schemas.openxmlformats.org/drawingml/2006/main" xmlns:r="http://schemas.openxmlformats.org/officeDocument/2006/relationships" xmlns:p188="http://schemas.microsoft.com/office/powerpoint/2018/8/main">
+  <p188:cm id="{FE4F3799-75D2-8240-9973-5F9E21510694}" authorId="{8A2040D5-E15A-5B35-04E9-E0BDBFB1B2F2}" created="2025-02-26T20:16:54.048">
+    <ac:deMkLst xmlns:ac="http://schemas.microsoft.com/office/drawing/2013/main/command">
+      <pc:docMk xmlns:pc="http://schemas.microsoft.com/office/powerpoint/2013/main/command"/>
+      <pc:sldMk xmlns:pc="http://schemas.microsoft.com/office/powerpoint/2013/main/command" cId="768561802" sldId="257"/>
+      <ac:picMk id="7" creationId="{984A3E5B-D57B-5361-F888-20BB84DE2F43}"/>
+    </ac:deMkLst>
+    <p188:replyLst>
+      <p188:reply id="{947665CD-F222-4648-8C3F-5FA2DF54D081}" authorId="{8A2040D5-E15A-5B35-04E9-E0BDBFB1B2F2}" created="2025-02-26T20:22:43.212">
+        <p188:txBody>
+          <a:bodyPr/>
+          <a:lstStyle/>
+          <a:p>
+            <a:r>
+              <a:rPr lang="en-US"/>
+              <a:t>Also, I’d go with Counts on x-axis, µg/L chl on y. That simple flip helps with the slope/intercept (calibration) application conceptually (doesn’t change it numerically, of course) because in this case you’re calculating a dependent variable chl from an independent counts.</a:t>
+            </a:r>
+          </a:p>
+        </p188:txBody>
+      </p188:reply>
+    </p188:replyLst>
+    <p188:txBody>
+      <a:bodyPr/>
+      <a:lstStyle/>
+      <a:p>
+        <a:r>
+          <a:rPr lang="en-US"/>
+          <a:t>Axis labels?</a:t>
+        </a:r>
+      </a:p>
+    </p188:txBody>
+  </p188:cm>
+</p188:cmLst>
+</file>
+
+<file path=ppt/comments/modernComment_102_17800E46.xml><?xml version="1.0" encoding="utf-8"?>
+<p188:cmLst xmlns:a="http://schemas.openxmlformats.org/drawingml/2006/main" xmlns:r="http://schemas.openxmlformats.org/officeDocument/2006/relationships" xmlns:p188="http://schemas.microsoft.com/office/powerpoint/2018/8/main">
+  <p188:cm id="{481173D9-C673-1A4B-A847-100AB5ABF95D}" authorId="{8A2040D5-E15A-5B35-04E9-E0BDBFB1B2F2}" created="2025-02-26T20:18:51.774">
+    <ac:deMkLst xmlns:ac="http://schemas.microsoft.com/office/drawing/2013/main/command">
+      <pc:docMk xmlns:pc="http://schemas.microsoft.com/office/powerpoint/2013/main/command"/>
+      <pc:sldMk xmlns:pc="http://schemas.microsoft.com/office/powerpoint/2013/main/command" cId="394268230" sldId="258"/>
+      <ac:picMk id="5" creationId="{B3EDE6B3-B523-856B-926D-F7C9DFA0AF45}"/>
+    </ac:deMkLst>
+    <p188:replyLst>
+      <p188:reply id="{C27AD868-6DD2-FD4D-BBA9-495A58140823}" authorId="{8A2040D5-E15A-5B35-04E9-E0BDBFB1B2F2}" created="2025-02-26T20:20:58.934">
+        <p188:txBody>
+          <a:bodyPr/>
+          <a:lstStyle/>
+          <a:p>
+            <a:r>
+              <a:rPr lang="en-US"/>
+              <a:t>Should also begin running samples in triplicate to calculate uncertainty around repeat sampling. 3 separate draws of water from Van Dorn.</a:t>
+            </a:r>
+          </a:p>
+        </p188:txBody>
+      </p188:reply>
+    </p188:replyLst>
+    <p188:txBody>
+      <a:bodyPr/>
+      <a:lstStyle/>
+      <a:p>
+        <a:r>
+          <a:rPr lang="en-US"/>
+          <a:t>Several things to consider. 1) Looks like the on vs. off signal delta here is less than the 17.89 µg/L average you report. That delta is a valuable number and should be considered the signal. 2) Sensor resolution (as discerned by the step changes just when sensor is on) looks poor. Worse than 1 µg/L when should be closer to ~ 0.1 µg/L.</a:t>
+        </a:r>
+      </a:p>
+    </p188:txBody>
+  </p188:cm>
+</p188:cmLst>
+</file>
+
+<file path=ppt/comments/modernComment_103_CBB59B5B.xml><?xml version="1.0" encoding="utf-8"?>
+<p188:cmLst xmlns:a="http://schemas.openxmlformats.org/drawingml/2006/main" xmlns:r="http://schemas.openxmlformats.org/officeDocument/2006/relationships" xmlns:p188="http://schemas.microsoft.com/office/powerpoint/2018/8/main">
+  <p188:cm id="{991F5E5C-568C-9345-BB9E-008CA1AF1A80}" authorId="{8A2040D5-E15A-5B35-04E9-E0BDBFB1B2F2}" created="2025-02-26T20:19:52.498">
+    <ac:txMkLst xmlns:ac="http://schemas.microsoft.com/office/drawing/2013/main/command">
+      <pc:docMk xmlns:pc="http://schemas.microsoft.com/office/powerpoint/2013/main/command"/>
+      <pc:sldMk xmlns:pc="http://schemas.microsoft.com/office/powerpoint/2013/main/command" cId="3417676635" sldId="259"/>
+      <ac:spMk id="3" creationId="{BE465ADA-1A01-978D-93C9-911592880B41}"/>
+      <ac:txMk cp="203" len="24">
+        <ac:context len="331" hash="4073668632"/>
+      </ac:txMk>
+    </ac:txMkLst>
+    <p188:pos x="4364865" y="3300167"/>
+    <p188:txBody>
+      <a:bodyPr/>
+      <a:lstStyle/>
+      <a:p>
+        <a:r>
+          <a:rPr lang="en-US"/>
+          <a:t>This term always trips me up, but it’s actually *non*photochemical quenching. </a:t>
+        </a:r>
+      </a:p>
+    </p188:txBody>
+  </p188:cm>
+</p188:cmLst>
+</file>
+
 <file path=ppt/slideLayouts/slideLayout1.xml><?xml version="1.0" encoding="utf-8"?>
 <p:sldLayout xmlns:a="http://schemas.openxmlformats.org/drawingml/2006/main" xmlns:r="http://schemas.openxmlformats.org/officeDocument/2006/relationships" xmlns:p="http://schemas.openxmlformats.org/presentationml/2006/main" type="title" preserve="1">
   <p:cSld name="Title Slide">
@@ -262,7 +366,7 @@
           <a:p>
             <a:fld id="{034F438D-5591-FD49-B3DB-324DDCFBAA06}" type="datetimeFigureOut">
               <a:rPr lang="en-US" smtClean="0"/>
-              <a:t>2/23/25</a:t>
+              <a:t>2/26/25</a:t>
             </a:fld>
             <a:endParaRPr lang="en-US"/>
           </a:p>
@@ -460,7 +564,7 @@
           <a:p>
             <a:fld id="{034F438D-5591-FD49-B3DB-324DDCFBAA06}" type="datetimeFigureOut">
               <a:rPr lang="en-US" smtClean="0"/>
-              <a:t>2/23/25</a:t>
+              <a:t>2/26/25</a:t>
             </a:fld>
             <a:endParaRPr lang="en-US"/>
           </a:p>
@@ -668,7 +772,7 @@
           <a:p>
             <a:fld id="{034F438D-5591-FD49-B3DB-324DDCFBAA06}" type="datetimeFigureOut">
               <a:rPr lang="en-US" smtClean="0"/>
-              <a:t>2/23/25</a:t>
+              <a:t>2/26/25</a:t>
             </a:fld>
             <a:endParaRPr lang="en-US"/>
           </a:p>
@@ -866,7 +970,7 @@
           <a:p>
             <a:fld id="{034F438D-5591-FD49-B3DB-324DDCFBAA06}" type="datetimeFigureOut">
               <a:rPr lang="en-US" smtClean="0"/>
-              <a:t>2/23/25</a:t>
+              <a:t>2/26/25</a:t>
             </a:fld>
             <a:endParaRPr lang="en-US"/>
           </a:p>
@@ -1141,7 +1245,7 @@
           <a:p>
             <a:fld id="{034F438D-5591-FD49-B3DB-324DDCFBAA06}" type="datetimeFigureOut">
               <a:rPr lang="en-US" smtClean="0"/>
-              <a:t>2/23/25</a:t>
+              <a:t>2/26/25</a:t>
             </a:fld>
             <a:endParaRPr lang="en-US"/>
           </a:p>
@@ -1406,7 +1510,7 @@
           <a:p>
             <a:fld id="{034F438D-5591-FD49-B3DB-324DDCFBAA06}" type="datetimeFigureOut">
               <a:rPr lang="en-US" smtClean="0"/>
-              <a:t>2/23/25</a:t>
+              <a:t>2/26/25</a:t>
             </a:fld>
             <a:endParaRPr lang="en-US"/>
           </a:p>
@@ -1818,7 +1922,7 @@
           <a:p>
             <a:fld id="{034F438D-5591-FD49-B3DB-324DDCFBAA06}" type="datetimeFigureOut">
               <a:rPr lang="en-US" smtClean="0"/>
-              <a:t>2/23/25</a:t>
+              <a:t>2/26/25</a:t>
             </a:fld>
             <a:endParaRPr lang="en-US"/>
           </a:p>
@@ -1959,7 +2063,7 @@
           <a:p>
             <a:fld id="{034F438D-5591-FD49-B3DB-324DDCFBAA06}" type="datetimeFigureOut">
               <a:rPr lang="en-US" smtClean="0"/>
-              <a:t>2/23/25</a:t>
+              <a:t>2/26/25</a:t>
             </a:fld>
             <a:endParaRPr lang="en-US"/>
           </a:p>
@@ -2072,7 +2176,7 @@
           <a:p>
             <a:fld id="{034F438D-5591-FD49-B3DB-324DDCFBAA06}" type="datetimeFigureOut">
               <a:rPr lang="en-US" smtClean="0"/>
-              <a:t>2/23/25</a:t>
+              <a:t>2/26/25</a:t>
             </a:fld>
             <a:endParaRPr lang="en-US"/>
           </a:p>
@@ -2383,7 +2487,7 @@
           <a:p>
             <a:fld id="{034F438D-5591-FD49-B3DB-324DDCFBAA06}" type="datetimeFigureOut">
               <a:rPr lang="en-US" smtClean="0"/>
-              <a:t>2/23/25</a:t>
+              <a:t>2/26/25</a:t>
             </a:fld>
             <a:endParaRPr lang="en-US"/>
           </a:p>
@@ -2671,7 +2775,7 @@
           <a:p>
             <a:fld id="{034F438D-5591-FD49-B3DB-324DDCFBAA06}" type="datetimeFigureOut">
               <a:rPr lang="en-US" smtClean="0"/>
-              <a:t>2/23/25</a:t>
+              <a:t>2/26/25</a:t>
             </a:fld>
             <a:endParaRPr lang="en-US"/>
           </a:p>
@@ -2912,7 +3016,7 @@
           <a:p>
             <a:fld id="{034F438D-5591-FD49-B3DB-324DDCFBAA06}" type="datetimeFigureOut">
               <a:rPr lang="en-US" smtClean="0"/>
-              <a:t>2/23/25</a:t>
+              <a:t>2/26/25</a:t>
             </a:fld>
             <a:endParaRPr lang="en-US"/>
           </a:p>
@@ -3425,7 +3529,7 @@
           <p:nvPr/>
         </p:nvPicPr>
         <p:blipFill>
-          <a:blip r:embed="rId2"/>
+          <a:blip r:embed="rId3"/>
           <a:stretch>
             <a:fillRect/>
           </a:stretch>
@@ -3455,7 +3559,7 @@
           <p:nvPr/>
         </p:nvPicPr>
         <p:blipFill>
-          <a:blip r:embed="rId3"/>
+          <a:blip r:embed="rId4"/>
           <a:stretch>
             <a:fillRect/>
           </a:stretch>
@@ -3901,6 +4005,11 @@
   <p:clrMapOvr>
     <a:masterClrMapping/>
   </p:clrMapOvr>
+  <p:extLst>
+    <p:ext uri="{6950BFC3-D8DA-4A85-94F7-54DA5524770B}">
+      <p188:commentRel xmlns:p188="http://schemas.microsoft.com/office/powerpoint/2018/8/main" r:id="rId2"/>
+    </p:ext>
+  </p:extLst>
 </p:sld>
 </file>
 
@@ -4034,7 +4143,7 @@
           <p:nvPr/>
         </p:nvPicPr>
         <p:blipFill>
-          <a:blip r:embed="rId2"/>
+          <a:blip r:embed="rId3"/>
           <a:stretch>
             <a:fillRect/>
           </a:stretch>
@@ -4064,7 +4173,7 @@
           <p:nvPr/>
         </p:nvPicPr>
         <p:blipFill>
-          <a:blip r:embed="rId3"/>
+          <a:blip r:embed="rId4"/>
           <a:stretch>
             <a:fillRect/>
           </a:stretch>
@@ -4089,6 +4198,11 @@
   <p:clrMapOvr>
     <a:masterClrMapping/>
   </p:clrMapOvr>
+  <p:extLst>
+    <p:ext uri="{6950BFC3-D8DA-4A85-94F7-54DA5524770B}">
+      <p188:commentRel xmlns:p188="http://schemas.microsoft.com/office/powerpoint/2018/8/main" r:id="rId2"/>
+    </p:ext>
+  </p:extLst>
 </p:sld>
 </file>
 
@@ -4229,6 +4343,11 @@
   <p:clrMapOvr>
     <a:masterClrMapping/>
   </p:clrMapOvr>
+  <p:extLst>
+    <p:ext uri="{6950BFC3-D8DA-4A85-94F7-54DA5524770B}">
+      <p188:commentRel xmlns:p188="http://schemas.microsoft.com/office/powerpoint/2018/8/main" r:id="rId2"/>
+    </p:ext>
+  </p:extLst>
 </p:sld>
 </file>
 

</xml_diff>